<commit_message>
added new block diagram to poster
</commit_message>
<xml_diff>
--- a/docs/poster/Flash_Carma_Poster.pptx
+++ b/docs/poster/Flash_Carma_Poster.pptx
@@ -197,7 +197,7 @@
           <a:p>
             <a:fld id="{64ED9595-0AE4-4B15-B393-D0F1DD0EB94B}" type="datetimeFigureOut">
               <a:rPr lang="en-US" smtClean="0"/>
-              <a:t>11/11/2022</a:t>
+              <a:t>11/15/22</a:t>
             </a:fld>
             <a:endParaRPr lang="en-US"/>
           </a:p>
@@ -684,7 +684,7 @@
           <a:p>
             <a:fld id="{41C03D7F-B796-4B92-B0C7-6D4C9CC8C787}" type="datetimeFigureOut">
               <a:rPr lang="en-US" smtClean="0"/>
-              <a:t>11/11/2022</a:t>
+              <a:t>11/15/22</a:t>
             </a:fld>
             <a:endParaRPr lang="en-US"/>
           </a:p>
@@ -854,7 +854,7 @@
           <a:p>
             <a:fld id="{41C03D7F-B796-4B92-B0C7-6D4C9CC8C787}" type="datetimeFigureOut">
               <a:rPr lang="en-US" smtClean="0"/>
-              <a:t>11/11/2022</a:t>
+              <a:t>11/15/22</a:t>
             </a:fld>
             <a:endParaRPr lang="en-US"/>
           </a:p>
@@ -1034,7 +1034,7 @@
           <a:p>
             <a:fld id="{41C03D7F-B796-4B92-B0C7-6D4C9CC8C787}" type="datetimeFigureOut">
               <a:rPr lang="en-US" smtClean="0"/>
-              <a:t>11/11/2022</a:t>
+              <a:t>11/15/22</a:t>
             </a:fld>
             <a:endParaRPr lang="en-US"/>
           </a:p>
@@ -1204,7 +1204,7 @@
           <a:p>
             <a:fld id="{41C03D7F-B796-4B92-B0C7-6D4C9CC8C787}" type="datetimeFigureOut">
               <a:rPr lang="en-US" smtClean="0"/>
-              <a:t>11/11/2022</a:t>
+              <a:t>11/15/22</a:t>
             </a:fld>
             <a:endParaRPr lang="en-US"/>
           </a:p>
@@ -1448,7 +1448,7 @@
           <a:p>
             <a:fld id="{41C03D7F-B796-4B92-B0C7-6D4C9CC8C787}" type="datetimeFigureOut">
               <a:rPr lang="en-US" smtClean="0"/>
-              <a:t>11/11/2022</a:t>
+              <a:t>11/15/22</a:t>
             </a:fld>
             <a:endParaRPr lang="en-US"/>
           </a:p>
@@ -1680,7 +1680,7 @@
           <a:p>
             <a:fld id="{41C03D7F-B796-4B92-B0C7-6D4C9CC8C787}" type="datetimeFigureOut">
               <a:rPr lang="en-US" smtClean="0"/>
-              <a:t>11/11/2022</a:t>
+              <a:t>11/15/22</a:t>
             </a:fld>
             <a:endParaRPr lang="en-US"/>
           </a:p>
@@ -2047,7 +2047,7 @@
           <a:p>
             <a:fld id="{41C03D7F-B796-4B92-B0C7-6D4C9CC8C787}" type="datetimeFigureOut">
               <a:rPr lang="en-US" smtClean="0"/>
-              <a:t>11/11/2022</a:t>
+              <a:t>11/15/22</a:t>
             </a:fld>
             <a:endParaRPr lang="en-US"/>
           </a:p>
@@ -2165,7 +2165,7 @@
           <a:p>
             <a:fld id="{41C03D7F-B796-4B92-B0C7-6D4C9CC8C787}" type="datetimeFigureOut">
               <a:rPr lang="en-US" smtClean="0"/>
-              <a:t>11/11/2022</a:t>
+              <a:t>11/15/22</a:t>
             </a:fld>
             <a:endParaRPr lang="en-US"/>
           </a:p>
@@ -2260,7 +2260,7 @@
           <a:p>
             <a:fld id="{41C03D7F-B796-4B92-B0C7-6D4C9CC8C787}" type="datetimeFigureOut">
               <a:rPr lang="en-US" smtClean="0"/>
-              <a:t>11/11/2022</a:t>
+              <a:t>11/15/22</a:t>
             </a:fld>
             <a:endParaRPr lang="en-US"/>
           </a:p>
@@ -2537,7 +2537,7 @@
           <a:p>
             <a:fld id="{41C03D7F-B796-4B92-B0C7-6D4C9CC8C787}" type="datetimeFigureOut">
               <a:rPr lang="en-US" smtClean="0"/>
-              <a:t>11/11/2022</a:t>
+              <a:t>11/15/22</a:t>
             </a:fld>
             <a:endParaRPr lang="en-US"/>
           </a:p>
@@ -2794,7 +2794,7 @@
           <a:p>
             <a:fld id="{41C03D7F-B796-4B92-B0C7-6D4C9CC8C787}" type="datetimeFigureOut">
               <a:rPr lang="en-US" smtClean="0"/>
-              <a:t>11/11/2022</a:t>
+              <a:t>11/15/22</a:t>
             </a:fld>
             <a:endParaRPr lang="en-US"/>
           </a:p>
@@ -3007,7 +3007,7 @@
           <a:p>
             <a:fld id="{41C03D7F-B796-4B92-B0C7-6D4C9CC8C787}" type="datetimeFigureOut">
               <a:rPr lang="en-US" smtClean="0"/>
-              <a:t>11/11/2022</a:t>
+              <a:t>11/15/22</a:t>
             </a:fld>
             <a:endParaRPr lang="en-US"/>
           </a:p>
@@ -4753,7 +4753,7 @@
                     <a:schemeClr val="tx1"/>
                   </a:solidFill>
                 </a:rPr>
-                <a:t>Screen capture of View Study Decks page.</a:t>
+                <a:t>Screen capture of the View Study Decks page.</a:t>
               </a:r>
               <a:endParaRPr lang="en-US" sz="3200" dirty="0"/>
             </a:p>
@@ -4811,9 +4811,9 @@
         <p:grpSpPr>
           <a:xfrm>
             <a:off x="1393904" y="25590192"/>
-            <a:ext cx="7521496" cy="10263882"/>
+            <a:ext cx="7521496" cy="10756325"/>
             <a:chOff x="1393904" y="25049860"/>
-            <a:chExt cx="7521496" cy="10263882"/>
+            <a:chExt cx="7521496" cy="10756325"/>
           </a:xfrm>
         </p:grpSpPr>
         <p:pic>
@@ -4867,7 +4867,7 @@
           <p:spPr>
             <a:xfrm>
               <a:off x="1618952" y="34728967"/>
-              <a:ext cx="7049095" cy="584775"/>
+              <a:ext cx="7049095" cy="1077218"/>
             </a:xfrm>
             <a:prstGeom prst="rect">
               <a:avLst/>
@@ -4912,135 +4912,79 @@
                     <a:schemeClr val="tx1"/>
                   </a:solidFill>
                 </a:rPr>
-                <a:t>Screen capture of Sign-Up page.</a:t>
+                <a:t>Screen capture of the Sign-Up page.</a:t>
               </a:r>
               <a:endParaRPr lang="en-US" sz="3200" dirty="0"/>
             </a:p>
           </p:txBody>
         </p:sp>
       </p:grpSp>
-      <p:grpSp>
-        <p:nvGrpSpPr>
-          <p:cNvPr id="37" name="Group 36">
+      <p:sp>
+        <p:nvSpPr>
+          <p:cNvPr id="39" name="TextBox 38">
             <a:extLst>
               <a:ext uri="{FF2B5EF4-FFF2-40B4-BE49-F238E27FC236}">
-                <a16:creationId xmlns:a16="http://schemas.microsoft.com/office/drawing/2014/main" id="{678AA044-0F32-2243-A844-B22364C508AC}"/>
+                <a16:creationId xmlns:a16="http://schemas.microsoft.com/office/drawing/2014/main" id="{FCA5836F-1883-2D43-8E07-019C91318D5B}"/>
               </a:ext>
             </a:extLst>
           </p:cNvPr>
-          <p:cNvGrpSpPr/>
+          <p:cNvSpPr txBox="1"/>
           <p:nvPr/>
-        </p:nvGrpSpPr>
-        <p:grpSpPr>
+        </p:nvSpPr>
+        <p:spPr>
           <a:xfrm>
-            <a:off x="10405794" y="27049269"/>
-            <a:ext cx="17270365" cy="9027328"/>
-            <a:chOff x="10405794" y="27049269"/>
-            <a:chExt cx="17270365" cy="9027328"/>
+            <a:off x="14675851" y="35491822"/>
+            <a:ext cx="13000308" cy="584775"/>
           </a:xfrm>
-        </p:grpSpPr>
-        <p:sp>
-          <p:nvSpPr>
-            <p:cNvPr id="39" name="TextBox 38">
-              <a:extLst>
-                <a:ext uri="{FF2B5EF4-FFF2-40B4-BE49-F238E27FC236}">
-                  <a16:creationId xmlns:a16="http://schemas.microsoft.com/office/drawing/2014/main" id="{FCA5836F-1883-2D43-8E07-019C91318D5B}"/>
-                </a:ext>
-              </a:extLst>
-            </p:cNvPr>
-            <p:cNvSpPr txBox="1"/>
-            <p:nvPr/>
-          </p:nvSpPr>
-          <p:spPr>
-            <a:xfrm>
-              <a:off x="14675851" y="35491822"/>
-              <a:ext cx="13000308" cy="584775"/>
-            </a:xfrm>
-            <a:prstGeom prst="rect">
-              <a:avLst/>
-            </a:prstGeom>
+          <a:prstGeom prst="rect">
+            <a:avLst/>
+          </a:prstGeom>
+          <a:noFill/>
+          <a:ln>
             <a:noFill/>
-            <a:ln>
-              <a:noFill/>
-            </a:ln>
-          </p:spPr>
-          <p:style>
-            <a:lnRef idx="2">
-              <a:schemeClr val="dk1"/>
-            </a:lnRef>
-            <a:fillRef idx="1">
-              <a:schemeClr val="lt1"/>
-            </a:fillRef>
-            <a:effectRef idx="0">
-              <a:schemeClr val="dk1"/>
-            </a:effectRef>
-            <a:fontRef idx="minor">
-              <a:schemeClr val="dk1"/>
-            </a:fontRef>
-          </p:style>
-          <p:txBody>
-            <a:bodyPr wrap="square" rtlCol="0">
-              <a:spAutoFit/>
-            </a:bodyPr>
-            <a:lstStyle/>
-            <a:p>
-              <a:pPr algn="just"/>
-              <a:r>
-                <a:rPr lang="en-US" sz="3200" b="1" dirty="0">
-                  <a:solidFill>
-                    <a:srgbClr val="BB1C3F"/>
-                  </a:solidFill>
-                </a:rPr>
-                <a:t>Figure 3: </a:t>
-              </a:r>
-              <a:r>
-                <a:rPr lang="en-US" sz="3200" dirty="0">
-                  <a:solidFill>
-                    <a:schemeClr val="tx1"/>
-                  </a:solidFill>
-                </a:rPr>
-                <a:t>Block Diagram for the Flash Carma application.</a:t>
-              </a:r>
-              <a:endParaRPr lang="en-US" sz="3200" dirty="0"/>
-            </a:p>
-          </p:txBody>
-        </p:sp>
-        <p:pic>
-          <p:nvPicPr>
-            <p:cNvPr id="61" name="Picture 60">
-              <a:extLst>
-                <a:ext uri="{FF2B5EF4-FFF2-40B4-BE49-F238E27FC236}">
-                  <a16:creationId xmlns:a16="http://schemas.microsoft.com/office/drawing/2014/main" id="{C630C238-750C-A248-89DD-E98C93ADB0CC}"/>
-                </a:ext>
-              </a:extLst>
-            </p:cNvPr>
-            <p:cNvPicPr>
-              <a:picLocks noChangeAspect="1"/>
-            </p:cNvPicPr>
-            <p:nvPr/>
-          </p:nvPicPr>
-          <p:blipFill rotWithShape="1">
-            <a:blip r:embed="rId7">
-              <a:extLst>
-                <a:ext uri="{28A0092B-C50C-407E-A947-70E740481C1C}">
-                  <a14:useLocalDpi xmlns:a14="http://schemas.microsoft.com/office/drawing/2010/main" val="0"/>
-                </a:ext>
-              </a:extLst>
-            </a:blip>
-            <a:srcRect l="6797" t="4561" r="8081" b="15483"/>
-            <a:stretch/>
-          </p:blipFill>
-          <p:spPr>
-            <a:xfrm>
-              <a:off x="10405794" y="27049269"/>
-              <a:ext cx="15924572" cy="8413888"/>
-            </a:xfrm>
-            <a:prstGeom prst="rect">
-              <a:avLst/>
-            </a:prstGeom>
-          </p:spPr>
-        </p:pic>
-      </p:grpSp>
+          </a:ln>
+        </p:spPr>
+        <p:style>
+          <a:lnRef idx="2">
+            <a:schemeClr val="dk1"/>
+          </a:lnRef>
+          <a:fillRef idx="1">
+            <a:schemeClr val="lt1"/>
+          </a:fillRef>
+          <a:effectRef idx="0">
+            <a:schemeClr val="dk1"/>
+          </a:effectRef>
+          <a:fontRef idx="minor">
+            <a:schemeClr val="dk1"/>
+          </a:fontRef>
+        </p:style>
+        <p:txBody>
+          <a:bodyPr wrap="square" rtlCol="0">
+            <a:spAutoFit/>
+          </a:bodyPr>
+          <a:lstStyle/>
+          <a:p>
+            <a:pPr algn="just"/>
+            <a:r>
+              <a:rPr lang="en-US" sz="3200" b="1" dirty="0">
+                <a:solidFill>
+                  <a:srgbClr val="BB1C3F"/>
+                </a:solidFill>
+              </a:rPr>
+              <a:t>Figure 3: </a:t>
+            </a:r>
+            <a:r>
+              <a:rPr lang="en-US" sz="3200" dirty="0">
+                <a:solidFill>
+                  <a:schemeClr val="tx1"/>
+                </a:solidFill>
+              </a:rPr>
+              <a:t>Block Diagram for the Flash Carma application.</a:t>
+            </a:r>
+            <a:endParaRPr lang="en-US" sz="3200" dirty="0"/>
+          </a:p>
+        </p:txBody>
+      </p:sp>
       <p:pic>
         <p:nvPicPr>
           <p:cNvPr id="68" name="Picture 67">
@@ -5056,7 +5000,7 @@
           <p:nvPr/>
         </p:nvPicPr>
         <p:blipFill>
-          <a:blip r:embed="rId8">
+          <a:blip r:embed="rId7">
             <a:extLst>
               <a:ext uri="{28A0092B-C50C-407E-A947-70E740481C1C}">
                 <a14:useLocalDpi xmlns:a14="http://schemas.microsoft.com/office/drawing/2010/main" val="0"/>
@@ -5080,6 +5024,42 @@
               <a:schemeClr val="tx1"/>
             </a:solidFill>
           </a:ln>
+        </p:spPr>
+      </p:pic>
+      <p:pic>
+        <p:nvPicPr>
+          <p:cNvPr id="43" name="Picture 42">
+            <a:extLst>
+              <a:ext uri="{FF2B5EF4-FFF2-40B4-BE49-F238E27FC236}">
+                <a16:creationId xmlns:a16="http://schemas.microsoft.com/office/drawing/2014/main" id="{5A011D8F-80FF-2C43-BF59-404BDCA88A77}"/>
+              </a:ext>
+            </a:extLst>
+          </p:cNvPr>
+          <p:cNvPicPr>
+            <a:picLocks noChangeAspect="1"/>
+          </p:cNvPicPr>
+          <p:nvPr/>
+        </p:nvPicPr>
+        <p:blipFill>
+          <a:blip r:embed="rId8">
+            <a:extLst>
+              <a:ext uri="{28A0092B-C50C-407E-A947-70E740481C1C}">
+                <a14:useLocalDpi xmlns:a14="http://schemas.microsoft.com/office/drawing/2010/main" val="0"/>
+              </a:ext>
+            </a:extLst>
+          </a:blip>
+          <a:stretch>
+            <a:fillRect/>
+          </a:stretch>
+        </p:blipFill>
+        <p:spPr>
+          <a:xfrm>
+            <a:off x="10572750" y="26806054"/>
+            <a:ext cx="16151678" cy="8623522"/>
+          </a:xfrm>
+          <a:prstGeom prst="rect">
+            <a:avLst/>
+          </a:prstGeom>
         </p:spPr>
       </p:pic>
     </p:spTree>

</xml_diff>